<commit_message>
correct the error in ppt
</commit_message>
<xml_diff>
--- a/簡報1.pptx
+++ b/簡報1.pptx
@@ -274,7 +274,7 @@
           <a:p>
             <a:fld id="{23C50C43-E062-47F2-A522-437119FDB227}" type="datetimeFigureOut">
               <a:rPr lang="zh-TW" altLang="en-US" smtClean="0"/>
-              <a:t>2020/3/16</a:t>
+              <a:t>2020/4/19</a:t>
             </a:fld>
             <a:endParaRPr lang="zh-TW" altLang="en-US"/>
           </a:p>
@@ -472,7 +472,7 @@
           <a:p>
             <a:fld id="{23C50C43-E062-47F2-A522-437119FDB227}" type="datetimeFigureOut">
               <a:rPr lang="zh-TW" altLang="en-US" smtClean="0"/>
-              <a:t>2020/3/16</a:t>
+              <a:t>2020/4/19</a:t>
             </a:fld>
             <a:endParaRPr lang="zh-TW" altLang="en-US"/>
           </a:p>
@@ -680,7 +680,7 @@
           <a:p>
             <a:fld id="{23C50C43-E062-47F2-A522-437119FDB227}" type="datetimeFigureOut">
               <a:rPr lang="zh-TW" altLang="en-US" smtClean="0"/>
-              <a:t>2020/3/16</a:t>
+              <a:t>2020/4/19</a:t>
             </a:fld>
             <a:endParaRPr lang="zh-TW" altLang="en-US"/>
           </a:p>
@@ -878,7 +878,7 @@
           <a:p>
             <a:fld id="{23C50C43-E062-47F2-A522-437119FDB227}" type="datetimeFigureOut">
               <a:rPr lang="zh-TW" altLang="en-US" smtClean="0"/>
-              <a:t>2020/3/16</a:t>
+              <a:t>2020/4/19</a:t>
             </a:fld>
             <a:endParaRPr lang="zh-TW" altLang="en-US"/>
           </a:p>
@@ -1153,7 +1153,7 @@
           <a:p>
             <a:fld id="{23C50C43-E062-47F2-A522-437119FDB227}" type="datetimeFigureOut">
               <a:rPr lang="zh-TW" altLang="en-US" smtClean="0"/>
-              <a:t>2020/3/16</a:t>
+              <a:t>2020/4/19</a:t>
             </a:fld>
             <a:endParaRPr lang="zh-TW" altLang="en-US"/>
           </a:p>
@@ -1418,7 +1418,7 @@
           <a:p>
             <a:fld id="{23C50C43-E062-47F2-A522-437119FDB227}" type="datetimeFigureOut">
               <a:rPr lang="zh-TW" altLang="en-US" smtClean="0"/>
-              <a:t>2020/3/16</a:t>
+              <a:t>2020/4/19</a:t>
             </a:fld>
             <a:endParaRPr lang="zh-TW" altLang="en-US"/>
           </a:p>
@@ -1830,7 +1830,7 @@
           <a:p>
             <a:fld id="{23C50C43-E062-47F2-A522-437119FDB227}" type="datetimeFigureOut">
               <a:rPr lang="zh-TW" altLang="en-US" smtClean="0"/>
-              <a:t>2020/3/16</a:t>
+              <a:t>2020/4/19</a:t>
             </a:fld>
             <a:endParaRPr lang="zh-TW" altLang="en-US"/>
           </a:p>
@@ -1971,7 +1971,7 @@
           <a:p>
             <a:fld id="{23C50C43-E062-47F2-A522-437119FDB227}" type="datetimeFigureOut">
               <a:rPr lang="zh-TW" altLang="en-US" smtClean="0"/>
-              <a:t>2020/3/16</a:t>
+              <a:t>2020/4/19</a:t>
             </a:fld>
             <a:endParaRPr lang="zh-TW" altLang="en-US"/>
           </a:p>
@@ -2084,7 +2084,7 @@
           <a:p>
             <a:fld id="{23C50C43-E062-47F2-A522-437119FDB227}" type="datetimeFigureOut">
               <a:rPr lang="zh-TW" altLang="en-US" smtClean="0"/>
-              <a:t>2020/3/16</a:t>
+              <a:t>2020/4/19</a:t>
             </a:fld>
             <a:endParaRPr lang="zh-TW" altLang="en-US"/>
           </a:p>
@@ -2395,7 +2395,7 @@
           <a:p>
             <a:fld id="{23C50C43-E062-47F2-A522-437119FDB227}" type="datetimeFigureOut">
               <a:rPr lang="zh-TW" altLang="en-US" smtClean="0"/>
-              <a:t>2020/3/16</a:t>
+              <a:t>2020/4/19</a:t>
             </a:fld>
             <a:endParaRPr lang="zh-TW" altLang="en-US"/>
           </a:p>
@@ -2686,7 +2686,7 @@
           <a:p>
             <a:fld id="{23C50C43-E062-47F2-A522-437119FDB227}" type="datetimeFigureOut">
               <a:rPr lang="zh-TW" altLang="en-US" smtClean="0"/>
-              <a:t>2020/3/16</a:t>
+              <a:t>2020/4/19</a:t>
             </a:fld>
             <a:endParaRPr lang="zh-TW" altLang="en-US"/>
           </a:p>
@@ -2927,7 +2927,7 @@
           <a:p>
             <a:fld id="{23C50C43-E062-47F2-A522-437119FDB227}" type="datetimeFigureOut">
               <a:rPr lang="zh-TW" altLang="en-US" smtClean="0"/>
-              <a:t>2020/3/16</a:t>
+              <a:t>2020/4/19</a:t>
             </a:fld>
             <a:endParaRPr lang="zh-TW" altLang="en-US"/>
           </a:p>
@@ -11314,7 +11314,7 @@
           <a:p>
             <a:r>
               <a:rPr lang="zh-TW" altLang="en-US" sz="2600" dirty="0"/>
-              <a:t>上九</a:t>
+              <a:t>上六</a:t>
             </a:r>
             <a:r>
               <a:rPr lang="en-US" altLang="zh-TW" sz="2600" dirty="0"/>
@@ -11337,7 +11337,7 @@
           <a:p>
             <a:r>
               <a:rPr lang="zh-TW" altLang="en-US" sz="2600" dirty="0"/>
-              <a:t>九五</a:t>
+              <a:t>六五</a:t>
             </a:r>
             <a:r>
               <a:rPr lang="en-US" altLang="zh-TW" sz="2600" dirty="0"/>

</xml_diff>

<commit_message>
corrected the ppt and add some graph to markdown
</commit_message>
<xml_diff>
--- a/簡報1.pptx
+++ b/簡報1.pptx
@@ -11337,7 +11337,7 @@
           <a:p>
             <a:r>
               <a:rPr lang="zh-TW" altLang="en-US" sz="2600" dirty="0"/>
-              <a:t>六五</a:t>
+              <a:t>九五</a:t>
             </a:r>
             <a:r>
               <a:rPr lang="en-US" altLang="zh-TW" sz="2600" dirty="0"/>
@@ -11360,7 +11360,7 @@
           <a:p>
             <a:r>
               <a:rPr lang="zh-TW" altLang="en-US" sz="2600" dirty="0"/>
-              <a:t>九四</a:t>
+              <a:t>六四</a:t>
             </a:r>
             <a:r>
               <a:rPr lang="en-US" altLang="zh-TW" sz="2600" dirty="0"/>
@@ -11383,7 +11383,7 @@
           <a:p>
             <a:r>
               <a:rPr lang="zh-TW" altLang="en-US" sz="2600" dirty="0"/>
-              <a:t>九三</a:t>
+              <a:t>六三</a:t>
             </a:r>
             <a:r>
               <a:rPr lang="en-US" altLang="zh-TW" sz="2600" dirty="0"/>
@@ -11417,7 +11417,7 @@
           <a:p>
             <a:r>
               <a:rPr lang="zh-TW" altLang="en-US" sz="2600" dirty="0"/>
-              <a:t>九二</a:t>
+              <a:t>六二</a:t>
             </a:r>
             <a:r>
               <a:rPr lang="en-US" altLang="zh-TW" sz="2600" dirty="0"/>

</xml_diff>